<commit_message>
Got ajax working using jsonp
</commit_message>
<xml_diff>
--- a/PowerPointWebAddIn1/PowerPointWebAddIn1/bin/Debug/Presentation1.pptx
+++ b/PowerPointWebAddIn1/PowerPointWebAddIn1/bin/Debug/Presentation1.pptx
@@ -2,10 +2,10 @@
 <file path=ppt/presentation.xml><?xml version="1.0" encoding="utf-8"?>
 <p:presentation xmlns:a="http://schemas.openxmlformats.org/drawingml/2006/main" xmlns:r="http://schemas.openxmlformats.org/officeDocument/2006/relationships" xmlns:p="http://schemas.openxmlformats.org/presentationml/2006/main" saveSubsetFonts="1">
   <p:sldMasterIdLst>
-    <p:sldMasterId id="2147483648" r:id="R5f68d1c6f4ba4368"/>
+    <p:sldMasterId id="2147483648" r:id="R52a98d174ced467f"/>
   </p:sldMasterIdLst>
   <p:sldIdLst>
-    <p:sldId id="256" r:id="R35ac9963567b48e9"/>
+    <p:sldId id="256" r:id="Rb439e45cdbb749b8"/>
   </p:sldIdLst>
   <p:sldSz cx="12192000" cy="6858000"/>
   <p:notesSz cx="6858000" cy="9144000"/>
@@ -2652,17 +2652,17 @@
   </p:cSld>
   <p:clrMap bg1="lt1" tx1="dk1" bg2="lt2" tx2="dk2" accent1="accent1" accent2="accent2" accent3="accent3" accent4="accent4" accent5="accent5" accent6="accent6" hlink="hlink" folHlink="folHlink"/>
   <p:sldLayoutIdLst>
-    <p:sldLayoutId id="2147483649" r:id="R37c12ce2637f4051"/>
-    <p:sldLayoutId id="2147483650" r:id="R5956899a96a246cd"/>
-    <p:sldLayoutId id="2147483651" r:id="R41b3c9f3faaf40ca"/>
-    <p:sldLayoutId id="2147483652" r:id="Rd5ad11d1d9874c2a"/>
-    <p:sldLayoutId id="2147483653" r:id="R42c5f25729e142b2"/>
-    <p:sldLayoutId id="2147483654" r:id="R3c0180d5c71b47cd"/>
-    <p:sldLayoutId id="2147483655" r:id="Rc969255c87d14f9f"/>
-    <p:sldLayoutId id="2147483656" r:id="R6a7b4e7cf0f345e5"/>
-    <p:sldLayoutId id="2147483657" r:id="Rac23c9574fc54415"/>
-    <p:sldLayoutId id="2147483658" r:id="R4afa17168aba497e"/>
-    <p:sldLayoutId id="2147483659" r:id="R6b482d2cbaa44c8c"/>
+    <p:sldLayoutId id="2147483649" r:id="R569a4c99f38746f2"/>
+    <p:sldLayoutId id="2147483650" r:id="Rca1adb1035cc42c7"/>
+    <p:sldLayoutId id="2147483651" r:id="R617803d3f5ef4d70"/>
+    <p:sldLayoutId id="2147483652" r:id="Rb6bcc3cce2f941be"/>
+    <p:sldLayoutId id="2147483653" r:id="R22641b627d734c81"/>
+    <p:sldLayoutId id="2147483654" r:id="R2ab33428c25d44cc"/>
+    <p:sldLayoutId id="2147483655" r:id="R8532961b232f434a"/>
+    <p:sldLayoutId id="2147483656" r:id="R453bfd57f18c4bd2"/>
+    <p:sldLayoutId id="2147483657" r:id="R69908cd023c24e9b"/>
+    <p:sldLayoutId id="2147483658" r:id="R4ea32f8db6044666"/>
+    <p:sldLayoutId id="2147483659" r:id="R27aa8b3e0fe8469a"/>
   </p:sldLayoutIdLst>
   <p:txStyles>
     <p:titleStyle>
@@ -3279,13 +3279,13 @@
 <file path=ppt/webextensions/taskpanes.xml><?xml version="1.0" encoding="utf-8"?>
 <wetp:taskpanes xmlns:r="http://schemas.openxmlformats.org/officeDocument/2006/relationships" xmlns:wetp="http://schemas.microsoft.com/office/webextensions/taskpanes/2010/11">
   <wetp:taskpane dockstate="" visibility="1" width="350" row="1">
-    <wetp:webextensionref xmlns:r="http://schemas.openxmlformats.org/officeDocument/2006/relationships" r:id="R347e714aeb1a4160"/>
+    <wetp:webextensionref xmlns:r="http://schemas.openxmlformats.org/officeDocument/2006/relationships" r:id="Rb2a1a8078c214f3b"/>
   </wetp:taskpane>
 </wetp:taskpanes>
 </file>
 
 <file path=ppt/webextensions/webextension.xml><?xml version="1.0" encoding="utf-8"?>
-<we:webextension xmlns:we="http://schemas.microsoft.com/office/webextensions/webextension/2010/11" id="{857f4bcf-96be-46b0-85fc-593fc5f304e8}">
+<we:webextension xmlns:we="http://schemas.microsoft.com/office/webextensions/webextension/2010/11" id="{bc983798-4b53-43ae-abda-7577ee650666}">
   <we:reference id="4d663618-aaf5-4fa6-9c08-ff343a399a6a" version="1.0.0.0" store="developer" storeType="Registry"/>
   <we:alternateReferences/>
   <we:properties/>

</xml_diff>

<commit_message>
removed server to its own repo
</commit_message>
<xml_diff>
--- a/PowerPointWebAddIn1/PowerPointWebAddIn1/bin/Debug/Presentation1.pptx
+++ b/PowerPointWebAddIn1/PowerPointWebAddIn1/bin/Debug/Presentation1.pptx
@@ -2,10 +2,10 @@
 <file path=ppt/presentation.xml><?xml version="1.0" encoding="utf-8"?>
 <p:presentation xmlns:a="http://schemas.openxmlformats.org/drawingml/2006/main" xmlns:r="http://schemas.openxmlformats.org/officeDocument/2006/relationships" xmlns:p="http://schemas.openxmlformats.org/presentationml/2006/main" saveSubsetFonts="1">
   <p:sldMasterIdLst>
-    <p:sldMasterId id="2147483648" r:id="R52a98d174ced467f"/>
+    <p:sldMasterId id="2147483648" r:id="R34f9e866f74c4b82"/>
   </p:sldMasterIdLst>
   <p:sldIdLst>
-    <p:sldId id="256" r:id="Rb439e45cdbb749b8"/>
+    <p:sldId id="256" r:id="Rd22ab55a511044fe"/>
   </p:sldIdLst>
   <p:sldSz cx="12192000" cy="6858000"/>
   <p:notesSz cx="6858000" cy="9144000"/>
@@ -2652,17 +2652,17 @@
   </p:cSld>
   <p:clrMap bg1="lt1" tx1="dk1" bg2="lt2" tx2="dk2" accent1="accent1" accent2="accent2" accent3="accent3" accent4="accent4" accent5="accent5" accent6="accent6" hlink="hlink" folHlink="folHlink"/>
   <p:sldLayoutIdLst>
-    <p:sldLayoutId id="2147483649" r:id="R569a4c99f38746f2"/>
-    <p:sldLayoutId id="2147483650" r:id="Rca1adb1035cc42c7"/>
-    <p:sldLayoutId id="2147483651" r:id="R617803d3f5ef4d70"/>
-    <p:sldLayoutId id="2147483652" r:id="Rb6bcc3cce2f941be"/>
-    <p:sldLayoutId id="2147483653" r:id="R22641b627d734c81"/>
-    <p:sldLayoutId id="2147483654" r:id="R2ab33428c25d44cc"/>
-    <p:sldLayoutId id="2147483655" r:id="R8532961b232f434a"/>
-    <p:sldLayoutId id="2147483656" r:id="R453bfd57f18c4bd2"/>
-    <p:sldLayoutId id="2147483657" r:id="R69908cd023c24e9b"/>
-    <p:sldLayoutId id="2147483658" r:id="R4ea32f8db6044666"/>
-    <p:sldLayoutId id="2147483659" r:id="R27aa8b3e0fe8469a"/>
+    <p:sldLayoutId id="2147483649" r:id="R3bc9c1cb78ea493a"/>
+    <p:sldLayoutId id="2147483650" r:id="R90d1041da35b4e86"/>
+    <p:sldLayoutId id="2147483651" r:id="R2b8202e6b38f4f43"/>
+    <p:sldLayoutId id="2147483652" r:id="R8cd29cb2d960426e"/>
+    <p:sldLayoutId id="2147483653" r:id="Rba0d81701128416f"/>
+    <p:sldLayoutId id="2147483654" r:id="Ra1cb8bd4431f4d99"/>
+    <p:sldLayoutId id="2147483655" r:id="R5959d0e0494a436b"/>
+    <p:sldLayoutId id="2147483656" r:id="Rd9341d34b5a84e17"/>
+    <p:sldLayoutId id="2147483657" r:id="R8501a65c686942d4"/>
+    <p:sldLayoutId id="2147483658" r:id="R35f4ec18746e4ec2"/>
+    <p:sldLayoutId id="2147483659" r:id="Rb4fa77e6e2c0485a"/>
   </p:sldLayoutIdLst>
   <p:txStyles>
     <p:titleStyle>
@@ -3279,13 +3279,13 @@
 <file path=ppt/webextensions/taskpanes.xml><?xml version="1.0" encoding="utf-8"?>
 <wetp:taskpanes xmlns:r="http://schemas.openxmlformats.org/officeDocument/2006/relationships" xmlns:wetp="http://schemas.microsoft.com/office/webextensions/taskpanes/2010/11">
   <wetp:taskpane dockstate="" visibility="1" width="350" row="1">
-    <wetp:webextensionref xmlns:r="http://schemas.openxmlformats.org/officeDocument/2006/relationships" r:id="Rb2a1a8078c214f3b"/>
+    <wetp:webextensionref xmlns:r="http://schemas.openxmlformats.org/officeDocument/2006/relationships" r:id="Raea0e329423c4b9d"/>
   </wetp:taskpane>
 </wetp:taskpanes>
 </file>
 
 <file path=ppt/webextensions/webextension.xml><?xml version="1.0" encoding="utf-8"?>
-<we:webextension xmlns:we="http://schemas.microsoft.com/office/webextensions/webextension/2010/11" id="{bc983798-4b53-43ae-abda-7577ee650666}">
+<we:webextension xmlns:we="http://schemas.microsoft.com/office/webextensions/webextension/2010/11" id="{d2347902-6442-4cb2-b5cc-71f3e0f8641e}">
   <we:reference id="4d663618-aaf5-4fa6-9c08-ff343a399a6a" version="1.0.0.0" store="developer" storeType="Registry"/>
   <we:alternateReferences/>
   <we:properties/>

</xml_diff>